<commit_message>
Women in business presentation updated
added animation to slides
</commit_message>
<xml_diff>
--- a/Women In Business Presentation.pptx
+++ b/Women In Business Presentation.pptx
@@ -28,8 +28,11 @@
     <p:sldId id="283" r:id="rId22"/>
     <p:sldId id="284" r:id="rId23"/>
     <p:sldId id="269" r:id="rId24"/>
-    <p:sldId id="285" r:id="rId25"/>
-    <p:sldId id="265" r:id="rId26"/>
+    <p:sldId id="286" r:id="rId25"/>
+    <p:sldId id="287" r:id="rId26"/>
+    <p:sldId id="288" r:id="rId27"/>
+    <p:sldId id="285" r:id="rId28"/>
+    <p:sldId id="289" r:id="rId29"/>
   </p:sldIdLst>
   <p:sldSz cx="12192000" cy="6858000"/>
   <p:notesSz cx="6858000" cy="9144000"/>
@@ -482,7 +485,7 @@
           <a:p>
             <a:fld id="{6606CE42-9294-4836-A840-A909238F13A8}" type="datetimeFigureOut">
               <a:rPr lang="en-US" smtClean="0"/>
-              <a:t>2/26/2022</a:t>
+              <a:t>3/12/2022</a:t>
             </a:fld>
             <a:endParaRPr lang="en-US"/>
           </a:p>
@@ -1570,7 +1573,7 @@
           <a:p>
             <a:fld id="{6606CE42-9294-4836-A840-A909238F13A8}" type="datetimeFigureOut">
               <a:rPr lang="en-US" smtClean="0"/>
-              <a:t>2/26/2022</a:t>
+              <a:t>3/12/2022</a:t>
             </a:fld>
             <a:endParaRPr lang="en-US"/>
           </a:p>
@@ -2550,7 +2553,7 @@
           <a:p>
             <a:fld id="{6606CE42-9294-4836-A840-A909238F13A8}" type="datetimeFigureOut">
               <a:rPr lang="en-US" smtClean="0"/>
-              <a:t>2/26/2022</a:t>
+              <a:t>3/12/2022</a:t>
             </a:fld>
             <a:endParaRPr lang="en-US"/>
           </a:p>
@@ -3684,7 +3687,7 @@
           <a:p>
             <a:fld id="{6606CE42-9294-4836-A840-A909238F13A8}" type="datetimeFigureOut">
               <a:rPr lang="en-US" smtClean="0"/>
-              <a:t>2/26/2022</a:t>
+              <a:t>3/12/2022</a:t>
             </a:fld>
             <a:endParaRPr lang="en-US"/>
           </a:p>
@@ -4717,7 +4720,7 @@
           <a:p>
             <a:fld id="{6606CE42-9294-4836-A840-A909238F13A8}" type="datetimeFigureOut">
               <a:rPr lang="en-US" smtClean="0"/>
-              <a:t>2/26/2022</a:t>
+              <a:t>3/12/2022</a:t>
             </a:fld>
             <a:endParaRPr lang="en-US"/>
           </a:p>
@@ -5377,7 +5380,7 @@
           <a:p>
             <a:fld id="{6606CE42-9294-4836-A840-A909238F13A8}" type="datetimeFigureOut">
               <a:rPr lang="en-US" smtClean="0"/>
-              <a:t>2/26/2022</a:t>
+              <a:t>3/12/2022</a:t>
             </a:fld>
             <a:endParaRPr lang="en-US"/>
           </a:p>
@@ -6238,7 +6241,7 @@
           <a:p>
             <a:fld id="{6606CE42-9294-4836-A840-A909238F13A8}" type="datetimeFigureOut">
               <a:rPr lang="en-US" smtClean="0"/>
-              <a:t>2/26/2022</a:t>
+              <a:t>3/12/2022</a:t>
             </a:fld>
             <a:endParaRPr lang="en-US"/>
           </a:p>
@@ -6428,7 +6431,7 @@
           <a:p>
             <a:fld id="{6606CE42-9294-4836-A840-A909238F13A8}" type="datetimeFigureOut">
               <a:rPr lang="en-US" smtClean="0"/>
-              <a:t>2/26/2022</a:t>
+              <a:t>3/12/2022</a:t>
             </a:fld>
             <a:endParaRPr lang="en-US"/>
           </a:p>
@@ -7400,7 +7403,7 @@
           <a:p>
             <a:fld id="{6606CE42-9294-4836-A840-A909238F13A8}" type="datetimeFigureOut">
               <a:rPr lang="en-US" smtClean="0"/>
-              <a:t>2/26/2022</a:t>
+              <a:t>3/12/2022</a:t>
             </a:fld>
             <a:endParaRPr lang="en-US"/>
           </a:p>
@@ -7611,7 +7614,7 @@
           <a:p>
             <a:fld id="{6606CE42-9294-4836-A840-A909238F13A8}" type="datetimeFigureOut">
               <a:rPr lang="en-US" smtClean="0"/>
-              <a:t>2/26/2022</a:t>
+              <a:t>3/12/2022</a:t>
             </a:fld>
             <a:endParaRPr lang="en-US"/>
           </a:p>
@@ -8645,7 +8648,7 @@
           <a:p>
             <a:fld id="{6606CE42-9294-4836-A840-A909238F13A8}" type="datetimeFigureOut">
               <a:rPr lang="en-US" smtClean="0"/>
-              <a:t>2/26/2022</a:t>
+              <a:t>3/12/2022</a:t>
             </a:fld>
             <a:endParaRPr lang="en-US"/>
           </a:p>
@@ -8917,7 +8920,7 @@
           <a:p>
             <a:fld id="{6606CE42-9294-4836-A840-A909238F13A8}" type="datetimeFigureOut">
               <a:rPr lang="en-US" smtClean="0"/>
-              <a:t>2/26/2022</a:t>
+              <a:t>3/12/2022</a:t>
             </a:fld>
             <a:endParaRPr lang="en-US"/>
           </a:p>
@@ -9327,7 +9330,7 @@
           <a:p>
             <a:fld id="{6606CE42-9294-4836-A840-A909238F13A8}" type="datetimeFigureOut">
               <a:rPr lang="en-US" smtClean="0"/>
-              <a:t>2/26/2022</a:t>
+              <a:t>3/12/2022</a:t>
             </a:fld>
             <a:endParaRPr lang="en-US"/>
           </a:p>
@@ -9454,7 +9457,7 @@
           <a:p>
             <a:fld id="{6606CE42-9294-4836-A840-A909238F13A8}" type="datetimeFigureOut">
               <a:rPr lang="en-US" smtClean="0"/>
-              <a:t>2/26/2022</a:t>
+              <a:t>3/12/2022</a:t>
             </a:fld>
             <a:endParaRPr lang="en-US"/>
           </a:p>
@@ -9549,7 +9552,7 @@
           <a:p>
             <a:fld id="{6606CE42-9294-4836-A840-A909238F13A8}" type="datetimeFigureOut">
               <a:rPr lang="en-US" smtClean="0"/>
-              <a:t>2/26/2022</a:t>
+              <a:t>3/12/2022</a:t>
             </a:fld>
             <a:endParaRPr lang="en-US"/>
           </a:p>
@@ -10630,7 +10633,7 @@
           <a:p>
             <a:fld id="{6606CE42-9294-4836-A840-A909238F13A8}" type="datetimeFigureOut">
               <a:rPr lang="en-US" smtClean="0"/>
-              <a:t>2/26/2022</a:t>
+              <a:t>3/12/2022</a:t>
             </a:fld>
             <a:endParaRPr lang="en-US"/>
           </a:p>
@@ -11738,7 +11741,7 @@
           <a:p>
             <a:fld id="{6606CE42-9294-4836-A840-A909238F13A8}" type="datetimeFigureOut">
               <a:rPr lang="en-US" smtClean="0"/>
-              <a:t>2/26/2022</a:t>
+              <a:t>3/12/2022</a:t>
             </a:fld>
             <a:endParaRPr lang="en-US"/>
           </a:p>
@@ -12735,7 +12738,7 @@
           <a:p>
             <a:fld id="{6606CE42-9294-4836-A840-A909238F13A8}" type="datetimeFigureOut">
               <a:rPr lang="en-US" smtClean="0"/>
-              <a:t>2/26/2022</a:t>
+              <a:t>3/12/2022</a:t>
             </a:fld>
             <a:endParaRPr lang="en-US"/>
           </a:p>
@@ -13422,6 +13425,18 @@
   <p:clrMapOvr>
     <a:masterClrMapping/>
   </p:clrMapOvr>
+  <mc:AlternateContent xmlns:mc="http://schemas.openxmlformats.org/markup-compatibility/2006">
+    <mc:Choice xmlns:p14="http://schemas.microsoft.com/office/powerpoint/2010/main" Requires="p14">
+      <p:transition spd="med" p14:dur="700">
+        <p:fade/>
+      </p:transition>
+    </mc:Choice>
+    <mc:Fallback>
+      <p:transition spd="med">
+        <p:fade/>
+      </p:transition>
+    </mc:Fallback>
+  </mc:AlternateContent>
 </p:sld>
 </file>
 
@@ -13552,6 +13567,18 @@
   <p:clrMapOvr>
     <a:masterClrMapping/>
   </p:clrMapOvr>
+  <mc:AlternateContent xmlns:mc="http://schemas.openxmlformats.org/markup-compatibility/2006">
+    <mc:Choice xmlns:p14="http://schemas.microsoft.com/office/powerpoint/2010/main" Requires="p14">
+      <p:transition spd="med" p14:dur="700">
+        <p:fade/>
+      </p:transition>
+    </mc:Choice>
+    <mc:Fallback>
+      <p:transition spd="med">
+        <p:fade/>
+      </p:transition>
+    </mc:Fallback>
+  </mc:AlternateContent>
 </p:sld>
 </file>
 
@@ -13677,6 +13704,18 @@
   <p:clrMapOvr>
     <a:masterClrMapping/>
   </p:clrMapOvr>
+  <mc:AlternateContent xmlns:mc="http://schemas.openxmlformats.org/markup-compatibility/2006">
+    <mc:Choice xmlns:p14="http://schemas.microsoft.com/office/powerpoint/2010/main" Requires="p14">
+      <p:transition spd="med" p14:dur="700">
+        <p:fade/>
+      </p:transition>
+    </mc:Choice>
+    <mc:Fallback>
+      <p:transition spd="med">
+        <p:fade/>
+      </p:transition>
+    </mc:Fallback>
+  </mc:AlternateContent>
 </p:sld>
 </file>
 
@@ -13802,6 +13841,18 @@
   <p:clrMapOvr>
     <a:masterClrMapping/>
   </p:clrMapOvr>
+  <mc:AlternateContent xmlns:mc="http://schemas.openxmlformats.org/markup-compatibility/2006">
+    <mc:Choice xmlns:p14="http://schemas.microsoft.com/office/powerpoint/2010/main" Requires="p14">
+      <p:transition spd="med" p14:dur="700">
+        <p:fade/>
+      </p:transition>
+    </mc:Choice>
+    <mc:Fallback>
+      <p:transition spd="med">
+        <p:fade/>
+      </p:transition>
+    </mc:Fallback>
+  </mc:AlternateContent>
 </p:sld>
 </file>
 
@@ -13962,6 +14013,18 @@
   <p:clrMapOvr>
     <a:masterClrMapping/>
   </p:clrMapOvr>
+  <mc:AlternateContent xmlns:mc="http://schemas.openxmlformats.org/markup-compatibility/2006">
+    <mc:Choice xmlns:p14="http://schemas.microsoft.com/office/powerpoint/2010/main" Requires="p14">
+      <p:transition spd="med" p14:dur="700">
+        <p:fade/>
+      </p:transition>
+    </mc:Choice>
+    <mc:Fallback>
+      <p:transition spd="med">
+        <p:fade/>
+      </p:transition>
+    </mc:Fallback>
+  </mc:AlternateContent>
 </p:sld>
 </file>
 
@@ -14130,6 +14193,18 @@
   <p:clrMapOvr>
     <a:masterClrMapping/>
   </p:clrMapOvr>
+  <mc:AlternateContent xmlns:mc="http://schemas.openxmlformats.org/markup-compatibility/2006">
+    <mc:Choice xmlns:p14="http://schemas.microsoft.com/office/powerpoint/2010/main" Requires="p14">
+      <p:transition spd="med" p14:dur="700">
+        <p:fade/>
+      </p:transition>
+    </mc:Choice>
+    <mc:Fallback>
+      <p:transition spd="med">
+        <p:fade/>
+      </p:transition>
+    </mc:Fallback>
+  </mc:AlternateContent>
 </p:sld>
 </file>
 
@@ -14290,6 +14365,18 @@
   <p:clrMapOvr>
     <a:masterClrMapping/>
   </p:clrMapOvr>
+  <mc:AlternateContent xmlns:mc="http://schemas.openxmlformats.org/markup-compatibility/2006">
+    <mc:Choice xmlns:p14="http://schemas.microsoft.com/office/powerpoint/2010/main" Requires="p14">
+      <p:transition spd="med" p14:dur="700">
+        <p:fade/>
+      </p:transition>
+    </mc:Choice>
+    <mc:Fallback>
+      <p:transition spd="med">
+        <p:fade/>
+      </p:transition>
+    </mc:Fallback>
+  </mc:AlternateContent>
 </p:sld>
 </file>
 
@@ -14450,6 +14537,18 @@
   <p:clrMapOvr>
     <a:masterClrMapping/>
   </p:clrMapOvr>
+  <mc:AlternateContent xmlns:mc="http://schemas.openxmlformats.org/markup-compatibility/2006">
+    <mc:Choice xmlns:p14="http://schemas.microsoft.com/office/powerpoint/2010/main" Requires="p14">
+      <p:transition spd="med" p14:dur="700">
+        <p:fade/>
+      </p:transition>
+    </mc:Choice>
+    <mc:Fallback>
+      <p:transition spd="med">
+        <p:fade/>
+      </p:transition>
+    </mc:Fallback>
+  </mc:AlternateContent>
 </p:sld>
 </file>
 
@@ -14524,6 +14623,18 @@
   <p:clrMapOvr>
     <a:masterClrMapping/>
   </p:clrMapOvr>
+  <mc:AlternateContent xmlns:mc="http://schemas.openxmlformats.org/markup-compatibility/2006">
+    <mc:Choice xmlns:p14="http://schemas.microsoft.com/office/powerpoint/2010/main" Requires="p14">
+      <p:transition spd="med" p14:dur="700">
+        <p:fade/>
+      </p:transition>
+    </mc:Choice>
+    <mc:Fallback>
+      <p:transition spd="med">
+        <p:fade/>
+      </p:transition>
+    </mc:Fallback>
+  </mc:AlternateContent>
 </p:sld>
 </file>
 
@@ -14675,6 +14786,18 @@
   <p:clrMapOvr>
     <a:masterClrMapping/>
   </p:clrMapOvr>
+  <mc:AlternateContent xmlns:mc="http://schemas.openxmlformats.org/markup-compatibility/2006">
+    <mc:Choice xmlns:p14="http://schemas.microsoft.com/office/powerpoint/2010/main" Requires="p14">
+      <p:transition spd="med" p14:dur="700">
+        <p:fade/>
+      </p:transition>
+    </mc:Choice>
+    <mc:Fallback>
+      <p:transition spd="med">
+        <p:fade/>
+      </p:transition>
+    </mc:Fallback>
+  </mc:AlternateContent>
 </p:sld>
 </file>
 
@@ -14856,6 +14979,18 @@
   <p:clrMapOvr>
     <a:masterClrMapping/>
   </p:clrMapOvr>
+  <mc:AlternateContent xmlns:mc="http://schemas.openxmlformats.org/markup-compatibility/2006">
+    <mc:Choice xmlns:p14="http://schemas.microsoft.com/office/powerpoint/2010/main" Requires="p14">
+      <p:transition spd="med" p14:dur="700">
+        <p:fade/>
+      </p:transition>
+    </mc:Choice>
+    <mc:Fallback>
+      <p:transition spd="med">
+        <p:fade/>
+      </p:transition>
+    </mc:Fallback>
+  </mc:AlternateContent>
 </p:sld>
 </file>
 
@@ -15018,6 +15153,18 @@
   <p:clrMapOvr>
     <a:masterClrMapping/>
   </p:clrMapOvr>
+  <mc:AlternateContent xmlns:mc="http://schemas.openxmlformats.org/markup-compatibility/2006">
+    <mc:Choice xmlns:p14="http://schemas.microsoft.com/office/powerpoint/2010/main" Requires="p14">
+      <p:transition spd="med" p14:dur="700">
+        <p:fade/>
+      </p:transition>
+    </mc:Choice>
+    <mc:Fallback>
+      <p:transition spd="med">
+        <p:fade/>
+      </p:transition>
+    </mc:Fallback>
+  </mc:AlternateContent>
 </p:sld>
 </file>
 
@@ -15189,6 +15336,18 @@
   <p:clrMapOvr>
     <a:masterClrMapping/>
   </p:clrMapOvr>
+  <mc:AlternateContent xmlns:mc="http://schemas.openxmlformats.org/markup-compatibility/2006">
+    <mc:Choice xmlns:p14="http://schemas.microsoft.com/office/powerpoint/2010/main" Requires="p14">
+      <p:transition spd="med" p14:dur="700">
+        <p:fade/>
+      </p:transition>
+    </mc:Choice>
+    <mc:Fallback>
+      <p:transition spd="med">
+        <p:fade/>
+      </p:transition>
+    </mc:Fallback>
+  </mc:AlternateContent>
 </p:sld>
 </file>
 
@@ -15332,6 +15491,18 @@
   <p:clrMapOvr>
     <a:masterClrMapping/>
   </p:clrMapOvr>
+  <mc:AlternateContent xmlns:mc="http://schemas.openxmlformats.org/markup-compatibility/2006">
+    <mc:Choice xmlns:p14="http://schemas.microsoft.com/office/powerpoint/2010/main" Requires="p14">
+      <p:transition spd="med" p14:dur="700">
+        <p:fade/>
+      </p:transition>
+    </mc:Choice>
+    <mc:Fallback>
+      <p:transition spd="med">
+        <p:fade/>
+      </p:transition>
+    </mc:Fallback>
+  </mc:AlternateContent>
 </p:sld>
 </file>
 
@@ -15457,6 +15628,18 @@
   <p:clrMapOvr>
     <a:masterClrMapping/>
   </p:clrMapOvr>
+  <mc:AlternateContent xmlns:mc="http://schemas.openxmlformats.org/markup-compatibility/2006">
+    <mc:Choice xmlns:p14="http://schemas.microsoft.com/office/powerpoint/2010/main" Requires="p14">
+      <p:transition spd="med" p14:dur="700">
+        <p:fade/>
+      </p:transition>
+    </mc:Choice>
+    <mc:Fallback>
+      <p:transition spd="med">
+        <p:fade/>
+      </p:transition>
+    </mc:Fallback>
+  </mc:AlternateContent>
 </p:sld>
 </file>
 
@@ -15519,6 +15702,18 @@
   <p:clrMapOvr>
     <a:masterClrMapping/>
   </p:clrMapOvr>
+  <mc:AlternateContent xmlns:mc="http://schemas.openxmlformats.org/markup-compatibility/2006">
+    <mc:Choice xmlns:p14="http://schemas.microsoft.com/office/powerpoint/2010/main" Requires="p14">
+      <p:transition spd="med" p14:dur="700">
+        <p:fade/>
+      </p:transition>
+    </mc:Choice>
+    <mc:Fallback>
+      <p:transition spd="med">
+        <p:fade/>
+      </p:transition>
+    </mc:Fallback>
+  </mc:AlternateContent>
 </p:sld>
 </file>
 
@@ -15562,6 +15757,1248 @@
           <a:p>
             <a:r>
               <a:rPr lang="en-US" dirty="0"/>
+              <a:t>Did any of the results surprise you? </a:t>
+            </a:r>
+          </a:p>
+        </p:txBody>
+      </p:sp>
+      <p:sp>
+        <p:nvSpPr>
+          <p:cNvPr id="3" name="Content Placeholder 2">
+            <a:extLst>
+              <a:ext uri="{FF2B5EF4-FFF2-40B4-BE49-F238E27FC236}">
+                <a16:creationId xmlns:a16="http://schemas.microsoft.com/office/drawing/2014/main" id="{432FE1D8-B326-481A-AE71-CC32AF3F969C}"/>
+              </a:ext>
+            </a:extLst>
+          </p:cNvPr>
+          <p:cNvSpPr>
+            <a:spLocks noGrp="1"/>
+          </p:cNvSpPr>
+          <p:nvPr>
+            <p:ph idx="1"/>
+          </p:nvPr>
+        </p:nvSpPr>
+        <p:spPr/>
+        <p:txBody>
+          <a:bodyPr>
+            <a:normAutofit/>
+          </a:bodyPr>
+          <a:lstStyle/>
+          <a:p>
+            <a:pPr rtl="0">
+              <a:spcBef>
+                <a:spcPts val="0"/>
+              </a:spcBef>
+              <a:spcAft>
+                <a:spcPts val="800"/>
+              </a:spcAft>
+            </a:pPr>
+            <a:r>
+              <a:rPr lang="en-US" sz="2400" dirty="0">
+                <a:solidFill>
+                  <a:schemeClr val="tx1"/>
+                </a:solidFill>
+              </a:rPr>
+              <a:t>Lack of evidence for an inherent connection between race, ethnicity, and sales</a:t>
+            </a:r>
+          </a:p>
+          <a:p>
+            <a:pPr rtl="0">
+              <a:spcBef>
+                <a:spcPts val="0"/>
+              </a:spcBef>
+              <a:spcAft>
+                <a:spcPts val="800"/>
+              </a:spcAft>
+            </a:pPr>
+            <a:r>
+              <a:rPr lang="en-US" sz="2400" dirty="0">
+                <a:solidFill>
+                  <a:schemeClr val="tx1"/>
+                </a:solidFill>
+              </a:rPr>
+              <a:t>Number of women-owned businesses in manufacturing, construction, and waste management</a:t>
+            </a:r>
+          </a:p>
+          <a:p>
+            <a:pPr rtl="0">
+              <a:spcBef>
+                <a:spcPts val="0"/>
+              </a:spcBef>
+              <a:spcAft>
+                <a:spcPts val="800"/>
+              </a:spcAft>
+            </a:pPr>
+            <a:r>
+              <a:rPr lang="en-US" sz="2400" dirty="0">
+                <a:solidFill>
+                  <a:schemeClr val="tx1"/>
+                </a:solidFill>
+              </a:rPr>
+              <a:t>Lack of evidence for an inherent connection between gender and sales</a:t>
+            </a:r>
+            <a:br>
+              <a:rPr lang="en-US" dirty="0"/>
+            </a:br>
+            <a:endParaRPr lang="en-US" dirty="0"/>
+          </a:p>
+        </p:txBody>
+      </p:sp>
+    </p:spTree>
+    <p:extLst>
+      <p:ext uri="{BB962C8B-B14F-4D97-AF65-F5344CB8AC3E}">
+        <p14:creationId xmlns:p14="http://schemas.microsoft.com/office/powerpoint/2010/main" val="2582855603"/>
+      </p:ext>
+    </p:extLst>
+  </p:cSld>
+  <p:clrMapOvr>
+    <a:masterClrMapping/>
+  </p:clrMapOvr>
+  <mc:AlternateContent xmlns:mc="http://schemas.openxmlformats.org/markup-compatibility/2006">
+    <mc:Choice xmlns:p14="http://schemas.microsoft.com/office/powerpoint/2010/main" Requires="p14">
+      <p:transition spd="slow" p14:dur="3400">
+        <p14:reveal/>
+      </p:transition>
+    </mc:Choice>
+    <mc:Fallback>
+      <p:transition spd="slow">
+        <p:fade/>
+      </p:transition>
+    </mc:Fallback>
+  </mc:AlternateContent>
+  <p:timing>
+    <p:tnLst>
+      <p:par>
+        <p:cTn id="1" dur="indefinite" restart="never" nodeType="tmRoot">
+          <p:childTnLst>
+            <p:seq concurrent="1" nextAc="seek">
+              <p:cTn id="2" dur="indefinite" nodeType="mainSeq">
+                <p:childTnLst>
+                  <p:par>
+                    <p:cTn id="3" fill="hold">
+                      <p:stCondLst>
+                        <p:cond delay="indefinite"/>
+                      </p:stCondLst>
+                      <p:childTnLst>
+                        <p:par>
+                          <p:cTn id="4" fill="hold">
+                            <p:stCondLst>
+                              <p:cond delay="0"/>
+                            </p:stCondLst>
+                            <p:childTnLst>
+                              <p:par>
+                                <p:cTn id="5" presetID="10" presetClass="entr" presetSubtype="0" fill="hold" grpId="0" nodeType="clickEffect">
+                                  <p:stCondLst>
+                                    <p:cond delay="0"/>
+                                  </p:stCondLst>
+                                  <p:childTnLst>
+                                    <p:set>
+                                      <p:cBhvr>
+                                        <p:cTn id="6" dur="1" fill="hold">
+                                          <p:stCondLst>
+                                            <p:cond delay="0"/>
+                                          </p:stCondLst>
+                                        </p:cTn>
+                                        <p:tgtEl>
+                                          <p:spTgt spid="2"/>
+                                        </p:tgtEl>
+                                        <p:attrNameLst>
+                                          <p:attrName>style.visibility</p:attrName>
+                                        </p:attrNameLst>
+                                      </p:cBhvr>
+                                      <p:to>
+                                        <p:strVal val="visible"/>
+                                      </p:to>
+                                    </p:set>
+                                    <p:animEffect transition="in" filter="fade">
+                                      <p:cBhvr>
+                                        <p:cTn id="7" dur="500"/>
+                                        <p:tgtEl>
+                                          <p:spTgt spid="2"/>
+                                        </p:tgtEl>
+                                      </p:cBhvr>
+                                    </p:animEffect>
+                                  </p:childTnLst>
+                                </p:cTn>
+                              </p:par>
+                            </p:childTnLst>
+                          </p:cTn>
+                        </p:par>
+                      </p:childTnLst>
+                    </p:cTn>
+                  </p:par>
+                  <p:par>
+                    <p:cTn id="8" fill="hold">
+                      <p:stCondLst>
+                        <p:cond delay="indefinite"/>
+                      </p:stCondLst>
+                      <p:childTnLst>
+                        <p:par>
+                          <p:cTn id="9" fill="hold">
+                            <p:stCondLst>
+                              <p:cond delay="0"/>
+                            </p:stCondLst>
+                            <p:childTnLst>
+                              <p:par>
+                                <p:cTn id="10" presetID="10" presetClass="entr" presetSubtype="0" fill="hold" grpId="0" nodeType="clickEffect">
+                                  <p:stCondLst>
+                                    <p:cond delay="0"/>
+                                  </p:stCondLst>
+                                  <p:childTnLst>
+                                    <p:set>
+                                      <p:cBhvr>
+                                        <p:cTn id="11" dur="1" fill="hold">
+                                          <p:stCondLst>
+                                            <p:cond delay="0"/>
+                                          </p:stCondLst>
+                                        </p:cTn>
+                                        <p:tgtEl>
+                                          <p:spTgt spid="3">
+                                            <p:txEl>
+                                              <p:pRg st="0" end="0"/>
+                                            </p:txEl>
+                                          </p:spTgt>
+                                        </p:tgtEl>
+                                        <p:attrNameLst>
+                                          <p:attrName>style.visibility</p:attrName>
+                                        </p:attrNameLst>
+                                      </p:cBhvr>
+                                      <p:to>
+                                        <p:strVal val="visible"/>
+                                      </p:to>
+                                    </p:set>
+                                    <p:animEffect transition="in" filter="fade">
+                                      <p:cBhvr>
+                                        <p:cTn id="12" dur="500"/>
+                                        <p:tgtEl>
+                                          <p:spTgt spid="3">
+                                            <p:txEl>
+                                              <p:pRg st="0" end="0"/>
+                                            </p:txEl>
+                                          </p:spTgt>
+                                        </p:tgtEl>
+                                      </p:cBhvr>
+                                    </p:animEffect>
+                                  </p:childTnLst>
+                                </p:cTn>
+                              </p:par>
+                            </p:childTnLst>
+                          </p:cTn>
+                        </p:par>
+                      </p:childTnLst>
+                    </p:cTn>
+                  </p:par>
+                  <p:par>
+                    <p:cTn id="13" fill="hold">
+                      <p:stCondLst>
+                        <p:cond delay="indefinite"/>
+                      </p:stCondLst>
+                      <p:childTnLst>
+                        <p:par>
+                          <p:cTn id="14" fill="hold">
+                            <p:stCondLst>
+                              <p:cond delay="0"/>
+                            </p:stCondLst>
+                            <p:childTnLst>
+                              <p:par>
+                                <p:cTn id="15" presetID="10" presetClass="entr" presetSubtype="0" fill="hold" grpId="0" nodeType="clickEffect">
+                                  <p:stCondLst>
+                                    <p:cond delay="0"/>
+                                  </p:stCondLst>
+                                  <p:childTnLst>
+                                    <p:set>
+                                      <p:cBhvr>
+                                        <p:cTn id="16" dur="1" fill="hold">
+                                          <p:stCondLst>
+                                            <p:cond delay="0"/>
+                                          </p:stCondLst>
+                                        </p:cTn>
+                                        <p:tgtEl>
+                                          <p:spTgt spid="3">
+                                            <p:txEl>
+                                              <p:pRg st="1" end="1"/>
+                                            </p:txEl>
+                                          </p:spTgt>
+                                        </p:tgtEl>
+                                        <p:attrNameLst>
+                                          <p:attrName>style.visibility</p:attrName>
+                                        </p:attrNameLst>
+                                      </p:cBhvr>
+                                      <p:to>
+                                        <p:strVal val="visible"/>
+                                      </p:to>
+                                    </p:set>
+                                    <p:animEffect transition="in" filter="fade">
+                                      <p:cBhvr>
+                                        <p:cTn id="17" dur="500"/>
+                                        <p:tgtEl>
+                                          <p:spTgt spid="3">
+                                            <p:txEl>
+                                              <p:pRg st="1" end="1"/>
+                                            </p:txEl>
+                                          </p:spTgt>
+                                        </p:tgtEl>
+                                      </p:cBhvr>
+                                    </p:animEffect>
+                                  </p:childTnLst>
+                                </p:cTn>
+                              </p:par>
+                            </p:childTnLst>
+                          </p:cTn>
+                        </p:par>
+                      </p:childTnLst>
+                    </p:cTn>
+                  </p:par>
+                  <p:par>
+                    <p:cTn id="18" fill="hold">
+                      <p:stCondLst>
+                        <p:cond delay="indefinite"/>
+                      </p:stCondLst>
+                      <p:childTnLst>
+                        <p:par>
+                          <p:cTn id="19" fill="hold">
+                            <p:stCondLst>
+                              <p:cond delay="0"/>
+                            </p:stCondLst>
+                            <p:childTnLst>
+                              <p:par>
+                                <p:cTn id="20" presetID="10" presetClass="entr" presetSubtype="0" fill="hold" grpId="0" nodeType="clickEffect">
+                                  <p:stCondLst>
+                                    <p:cond delay="0"/>
+                                  </p:stCondLst>
+                                  <p:childTnLst>
+                                    <p:set>
+                                      <p:cBhvr>
+                                        <p:cTn id="21" dur="1" fill="hold">
+                                          <p:stCondLst>
+                                            <p:cond delay="0"/>
+                                          </p:stCondLst>
+                                        </p:cTn>
+                                        <p:tgtEl>
+                                          <p:spTgt spid="3">
+                                            <p:txEl>
+                                              <p:pRg st="2" end="2"/>
+                                            </p:txEl>
+                                          </p:spTgt>
+                                        </p:tgtEl>
+                                        <p:attrNameLst>
+                                          <p:attrName>style.visibility</p:attrName>
+                                        </p:attrNameLst>
+                                      </p:cBhvr>
+                                      <p:to>
+                                        <p:strVal val="visible"/>
+                                      </p:to>
+                                    </p:set>
+                                    <p:animEffect transition="in" filter="fade">
+                                      <p:cBhvr>
+                                        <p:cTn id="22" dur="500"/>
+                                        <p:tgtEl>
+                                          <p:spTgt spid="3">
+                                            <p:txEl>
+                                              <p:pRg st="2" end="2"/>
+                                            </p:txEl>
+                                          </p:spTgt>
+                                        </p:tgtEl>
+                                      </p:cBhvr>
+                                    </p:animEffect>
+                                  </p:childTnLst>
+                                </p:cTn>
+                              </p:par>
+                            </p:childTnLst>
+                          </p:cTn>
+                        </p:par>
+                      </p:childTnLst>
+                    </p:cTn>
+                  </p:par>
+                </p:childTnLst>
+              </p:cTn>
+              <p:prevCondLst>
+                <p:cond evt="onPrev" delay="0">
+                  <p:tgtEl>
+                    <p:sldTgt/>
+                  </p:tgtEl>
+                </p:cond>
+              </p:prevCondLst>
+              <p:nextCondLst>
+                <p:cond evt="onNext" delay="0">
+                  <p:tgtEl>
+                    <p:sldTgt/>
+                  </p:tgtEl>
+                </p:cond>
+              </p:nextCondLst>
+            </p:seq>
+          </p:childTnLst>
+        </p:cTn>
+      </p:par>
+    </p:tnLst>
+    <p:bldLst>
+      <p:bldP spid="2" grpId="0"/>
+      <p:bldP spid="3" grpId="0" build="p"/>
+    </p:bldLst>
+  </p:timing>
+</p:sld>
+</file>
+
+<file path=ppt/slides/slide25.xml><?xml version="1.0" encoding="utf-8"?>
+<p:sld xmlns:a="http://schemas.openxmlformats.org/drawingml/2006/main" xmlns:r="http://schemas.openxmlformats.org/officeDocument/2006/relationships" xmlns:p="http://schemas.openxmlformats.org/presentationml/2006/main">
+  <p:cSld>
+    <p:spTree>
+      <p:nvGrpSpPr>
+        <p:cNvPr id="1" name=""/>
+        <p:cNvGrpSpPr/>
+        <p:nvPr/>
+      </p:nvGrpSpPr>
+      <p:grpSpPr>
+        <a:xfrm>
+          <a:off x="0" y="0"/>
+          <a:ext cx="0" cy="0"/>
+          <a:chOff x="0" y="0"/>
+          <a:chExt cx="0" cy="0"/>
+        </a:xfrm>
+      </p:grpSpPr>
+      <p:sp>
+        <p:nvSpPr>
+          <p:cNvPr id="2" name="Title 1">
+            <a:extLst>
+              <a:ext uri="{FF2B5EF4-FFF2-40B4-BE49-F238E27FC236}">
+                <a16:creationId xmlns:a16="http://schemas.microsoft.com/office/drawing/2014/main" id="{E6171A0E-422B-45DA-9D0E-6949BF32A3BD}"/>
+              </a:ext>
+            </a:extLst>
+          </p:cNvPr>
+          <p:cNvSpPr>
+            <a:spLocks noGrp="1"/>
+          </p:cNvSpPr>
+          <p:nvPr>
+            <p:ph type="title"/>
+          </p:nvPr>
+        </p:nvSpPr>
+        <p:spPr/>
+        <p:txBody>
+          <a:bodyPr/>
+          <a:lstStyle/>
+          <a:p>
+            <a:r>
+              <a:rPr lang="en-US" dirty="0"/>
+              <a:t>Did we find any institutional biases during our research?</a:t>
+            </a:r>
+          </a:p>
+        </p:txBody>
+      </p:sp>
+      <p:sp>
+        <p:nvSpPr>
+          <p:cNvPr id="3" name="Content Placeholder 2">
+            <a:extLst>
+              <a:ext uri="{FF2B5EF4-FFF2-40B4-BE49-F238E27FC236}">
+                <a16:creationId xmlns:a16="http://schemas.microsoft.com/office/drawing/2014/main" id="{432FE1D8-B326-481A-AE71-CC32AF3F969C}"/>
+              </a:ext>
+            </a:extLst>
+          </p:cNvPr>
+          <p:cNvSpPr>
+            <a:spLocks noGrp="1"/>
+          </p:cNvSpPr>
+          <p:nvPr>
+            <p:ph idx="1"/>
+          </p:nvPr>
+        </p:nvSpPr>
+        <p:spPr/>
+        <p:txBody>
+          <a:bodyPr>
+            <a:normAutofit/>
+          </a:bodyPr>
+          <a:lstStyle/>
+          <a:p>
+            <a:pPr rtl="0">
+              <a:spcBef>
+                <a:spcPts val="0"/>
+              </a:spcBef>
+              <a:spcAft>
+                <a:spcPts val="800"/>
+              </a:spcAft>
+            </a:pPr>
+            <a:r>
+              <a:rPr lang="en-US" sz="2800" dirty="0"/>
+              <a:t>Did not find any institutional biases</a:t>
+            </a:r>
+          </a:p>
+          <a:p>
+            <a:pPr rtl="0">
+              <a:spcBef>
+                <a:spcPts val="0"/>
+              </a:spcBef>
+              <a:spcAft>
+                <a:spcPts val="800"/>
+              </a:spcAft>
+            </a:pPr>
+            <a:r>
+              <a:rPr lang="en-US" sz="2800" dirty="0"/>
+              <a:t>Women did not take advantage of financial opportunities as often as men</a:t>
+            </a:r>
+          </a:p>
+          <a:p>
+            <a:pPr rtl="0">
+              <a:spcBef>
+                <a:spcPts val="0"/>
+              </a:spcBef>
+              <a:spcAft>
+                <a:spcPts val="800"/>
+              </a:spcAft>
+            </a:pPr>
+            <a:r>
+              <a:rPr lang="en-US" sz="2800" dirty="0"/>
+              <a:t>Limiting business growth for women and/or entrances into other markets</a:t>
+            </a:r>
+            <a:br>
+              <a:rPr lang="en-US" dirty="0"/>
+            </a:br>
+            <a:endParaRPr lang="en-US" dirty="0"/>
+          </a:p>
+        </p:txBody>
+      </p:sp>
+    </p:spTree>
+    <p:extLst>
+      <p:ext uri="{BB962C8B-B14F-4D97-AF65-F5344CB8AC3E}">
+        <p14:creationId xmlns:p14="http://schemas.microsoft.com/office/powerpoint/2010/main" val="1199085014"/>
+      </p:ext>
+    </p:extLst>
+  </p:cSld>
+  <p:clrMapOvr>
+    <a:masterClrMapping/>
+  </p:clrMapOvr>
+  <mc:AlternateContent xmlns:mc="http://schemas.openxmlformats.org/markup-compatibility/2006">
+    <mc:Choice xmlns:p14="http://schemas.microsoft.com/office/powerpoint/2010/main" Requires="p14">
+      <p:transition spd="med" p14:dur="700">
+        <p:fade/>
+      </p:transition>
+    </mc:Choice>
+    <mc:Fallback>
+      <p:transition spd="med">
+        <p:fade/>
+      </p:transition>
+    </mc:Fallback>
+  </mc:AlternateContent>
+  <p:timing>
+    <p:tnLst>
+      <p:par>
+        <p:cTn id="1" dur="indefinite" restart="never" nodeType="tmRoot">
+          <p:childTnLst>
+            <p:seq concurrent="1" nextAc="seek">
+              <p:cTn id="2" dur="indefinite" nodeType="mainSeq">
+                <p:childTnLst>
+                  <p:par>
+                    <p:cTn id="3" fill="hold">
+                      <p:stCondLst>
+                        <p:cond delay="indefinite"/>
+                      </p:stCondLst>
+                      <p:childTnLst>
+                        <p:par>
+                          <p:cTn id="4" fill="hold">
+                            <p:stCondLst>
+                              <p:cond delay="0"/>
+                            </p:stCondLst>
+                            <p:childTnLst>
+                              <p:par>
+                                <p:cTn id="5" presetID="10" presetClass="entr" presetSubtype="0" fill="hold" grpId="0" nodeType="clickEffect">
+                                  <p:stCondLst>
+                                    <p:cond delay="0"/>
+                                  </p:stCondLst>
+                                  <p:childTnLst>
+                                    <p:set>
+                                      <p:cBhvr>
+                                        <p:cTn id="6" dur="1" fill="hold">
+                                          <p:stCondLst>
+                                            <p:cond delay="0"/>
+                                          </p:stCondLst>
+                                        </p:cTn>
+                                        <p:tgtEl>
+                                          <p:spTgt spid="2"/>
+                                        </p:tgtEl>
+                                        <p:attrNameLst>
+                                          <p:attrName>style.visibility</p:attrName>
+                                        </p:attrNameLst>
+                                      </p:cBhvr>
+                                      <p:to>
+                                        <p:strVal val="visible"/>
+                                      </p:to>
+                                    </p:set>
+                                    <p:animEffect transition="in" filter="fade">
+                                      <p:cBhvr>
+                                        <p:cTn id="7" dur="500"/>
+                                        <p:tgtEl>
+                                          <p:spTgt spid="2"/>
+                                        </p:tgtEl>
+                                      </p:cBhvr>
+                                    </p:animEffect>
+                                  </p:childTnLst>
+                                </p:cTn>
+                              </p:par>
+                            </p:childTnLst>
+                          </p:cTn>
+                        </p:par>
+                      </p:childTnLst>
+                    </p:cTn>
+                  </p:par>
+                  <p:par>
+                    <p:cTn id="8" fill="hold">
+                      <p:stCondLst>
+                        <p:cond delay="indefinite"/>
+                      </p:stCondLst>
+                      <p:childTnLst>
+                        <p:par>
+                          <p:cTn id="9" fill="hold">
+                            <p:stCondLst>
+                              <p:cond delay="0"/>
+                            </p:stCondLst>
+                            <p:childTnLst>
+                              <p:par>
+                                <p:cTn id="10" presetID="10" presetClass="entr" presetSubtype="0" fill="hold" grpId="0" nodeType="clickEffect">
+                                  <p:stCondLst>
+                                    <p:cond delay="0"/>
+                                  </p:stCondLst>
+                                  <p:childTnLst>
+                                    <p:set>
+                                      <p:cBhvr>
+                                        <p:cTn id="11" dur="1" fill="hold">
+                                          <p:stCondLst>
+                                            <p:cond delay="0"/>
+                                          </p:stCondLst>
+                                        </p:cTn>
+                                        <p:tgtEl>
+                                          <p:spTgt spid="3">
+                                            <p:txEl>
+                                              <p:pRg st="0" end="0"/>
+                                            </p:txEl>
+                                          </p:spTgt>
+                                        </p:tgtEl>
+                                        <p:attrNameLst>
+                                          <p:attrName>style.visibility</p:attrName>
+                                        </p:attrNameLst>
+                                      </p:cBhvr>
+                                      <p:to>
+                                        <p:strVal val="visible"/>
+                                      </p:to>
+                                    </p:set>
+                                    <p:animEffect transition="in" filter="fade">
+                                      <p:cBhvr>
+                                        <p:cTn id="12" dur="500"/>
+                                        <p:tgtEl>
+                                          <p:spTgt spid="3">
+                                            <p:txEl>
+                                              <p:pRg st="0" end="0"/>
+                                            </p:txEl>
+                                          </p:spTgt>
+                                        </p:tgtEl>
+                                      </p:cBhvr>
+                                    </p:animEffect>
+                                  </p:childTnLst>
+                                </p:cTn>
+                              </p:par>
+                            </p:childTnLst>
+                          </p:cTn>
+                        </p:par>
+                      </p:childTnLst>
+                    </p:cTn>
+                  </p:par>
+                  <p:par>
+                    <p:cTn id="13" fill="hold">
+                      <p:stCondLst>
+                        <p:cond delay="indefinite"/>
+                      </p:stCondLst>
+                      <p:childTnLst>
+                        <p:par>
+                          <p:cTn id="14" fill="hold">
+                            <p:stCondLst>
+                              <p:cond delay="0"/>
+                            </p:stCondLst>
+                            <p:childTnLst>
+                              <p:par>
+                                <p:cTn id="15" presetID="10" presetClass="entr" presetSubtype="0" fill="hold" grpId="0" nodeType="clickEffect">
+                                  <p:stCondLst>
+                                    <p:cond delay="0"/>
+                                  </p:stCondLst>
+                                  <p:childTnLst>
+                                    <p:set>
+                                      <p:cBhvr>
+                                        <p:cTn id="16" dur="1" fill="hold">
+                                          <p:stCondLst>
+                                            <p:cond delay="0"/>
+                                          </p:stCondLst>
+                                        </p:cTn>
+                                        <p:tgtEl>
+                                          <p:spTgt spid="3">
+                                            <p:txEl>
+                                              <p:pRg st="1" end="1"/>
+                                            </p:txEl>
+                                          </p:spTgt>
+                                        </p:tgtEl>
+                                        <p:attrNameLst>
+                                          <p:attrName>style.visibility</p:attrName>
+                                        </p:attrNameLst>
+                                      </p:cBhvr>
+                                      <p:to>
+                                        <p:strVal val="visible"/>
+                                      </p:to>
+                                    </p:set>
+                                    <p:animEffect transition="in" filter="fade">
+                                      <p:cBhvr>
+                                        <p:cTn id="17" dur="500"/>
+                                        <p:tgtEl>
+                                          <p:spTgt spid="3">
+                                            <p:txEl>
+                                              <p:pRg st="1" end="1"/>
+                                            </p:txEl>
+                                          </p:spTgt>
+                                        </p:tgtEl>
+                                      </p:cBhvr>
+                                    </p:animEffect>
+                                  </p:childTnLst>
+                                </p:cTn>
+                              </p:par>
+                            </p:childTnLst>
+                          </p:cTn>
+                        </p:par>
+                      </p:childTnLst>
+                    </p:cTn>
+                  </p:par>
+                  <p:par>
+                    <p:cTn id="18" fill="hold">
+                      <p:stCondLst>
+                        <p:cond delay="indefinite"/>
+                      </p:stCondLst>
+                      <p:childTnLst>
+                        <p:par>
+                          <p:cTn id="19" fill="hold">
+                            <p:stCondLst>
+                              <p:cond delay="0"/>
+                            </p:stCondLst>
+                            <p:childTnLst>
+                              <p:par>
+                                <p:cTn id="20" presetID="10" presetClass="entr" presetSubtype="0" fill="hold" grpId="0" nodeType="clickEffect">
+                                  <p:stCondLst>
+                                    <p:cond delay="0"/>
+                                  </p:stCondLst>
+                                  <p:childTnLst>
+                                    <p:set>
+                                      <p:cBhvr>
+                                        <p:cTn id="21" dur="1" fill="hold">
+                                          <p:stCondLst>
+                                            <p:cond delay="0"/>
+                                          </p:stCondLst>
+                                        </p:cTn>
+                                        <p:tgtEl>
+                                          <p:spTgt spid="3">
+                                            <p:txEl>
+                                              <p:pRg st="2" end="2"/>
+                                            </p:txEl>
+                                          </p:spTgt>
+                                        </p:tgtEl>
+                                        <p:attrNameLst>
+                                          <p:attrName>style.visibility</p:attrName>
+                                        </p:attrNameLst>
+                                      </p:cBhvr>
+                                      <p:to>
+                                        <p:strVal val="visible"/>
+                                      </p:to>
+                                    </p:set>
+                                    <p:animEffect transition="in" filter="fade">
+                                      <p:cBhvr>
+                                        <p:cTn id="22" dur="500"/>
+                                        <p:tgtEl>
+                                          <p:spTgt spid="3">
+                                            <p:txEl>
+                                              <p:pRg st="2" end="2"/>
+                                            </p:txEl>
+                                          </p:spTgt>
+                                        </p:tgtEl>
+                                      </p:cBhvr>
+                                    </p:animEffect>
+                                  </p:childTnLst>
+                                </p:cTn>
+                              </p:par>
+                            </p:childTnLst>
+                          </p:cTn>
+                        </p:par>
+                      </p:childTnLst>
+                    </p:cTn>
+                  </p:par>
+                </p:childTnLst>
+              </p:cTn>
+              <p:prevCondLst>
+                <p:cond evt="onPrev" delay="0">
+                  <p:tgtEl>
+                    <p:sldTgt/>
+                  </p:tgtEl>
+                </p:cond>
+              </p:prevCondLst>
+              <p:nextCondLst>
+                <p:cond evt="onNext" delay="0">
+                  <p:tgtEl>
+                    <p:sldTgt/>
+                  </p:tgtEl>
+                </p:cond>
+              </p:nextCondLst>
+            </p:seq>
+          </p:childTnLst>
+        </p:cTn>
+      </p:par>
+    </p:tnLst>
+    <p:bldLst>
+      <p:bldP spid="2" grpId="0"/>
+      <p:bldP spid="3" grpId="0" build="p"/>
+    </p:bldLst>
+  </p:timing>
+</p:sld>
+</file>
+
+<file path=ppt/slides/slide26.xml><?xml version="1.0" encoding="utf-8"?>
+<p:sld xmlns:a="http://schemas.openxmlformats.org/drawingml/2006/main" xmlns:r="http://schemas.openxmlformats.org/officeDocument/2006/relationships" xmlns:p="http://schemas.openxmlformats.org/presentationml/2006/main">
+  <p:cSld>
+    <p:spTree>
+      <p:nvGrpSpPr>
+        <p:cNvPr id="1" name=""/>
+        <p:cNvGrpSpPr/>
+        <p:nvPr/>
+      </p:nvGrpSpPr>
+      <p:grpSpPr>
+        <a:xfrm>
+          <a:off x="0" y="0"/>
+          <a:ext cx="0" cy="0"/>
+          <a:chOff x="0" y="0"/>
+          <a:chExt cx="0" cy="0"/>
+        </a:xfrm>
+      </p:grpSpPr>
+      <p:sp>
+        <p:nvSpPr>
+          <p:cNvPr id="2" name="Title 1">
+            <a:extLst>
+              <a:ext uri="{FF2B5EF4-FFF2-40B4-BE49-F238E27FC236}">
+                <a16:creationId xmlns:a16="http://schemas.microsoft.com/office/drawing/2014/main" id="{E6171A0E-422B-45DA-9D0E-6949BF32A3BD}"/>
+              </a:ext>
+            </a:extLst>
+          </p:cNvPr>
+          <p:cNvSpPr>
+            <a:spLocks noGrp="1"/>
+          </p:cNvSpPr>
+          <p:nvPr>
+            <p:ph type="title"/>
+          </p:nvPr>
+        </p:nvSpPr>
+        <p:spPr/>
+        <p:txBody>
+          <a:bodyPr/>
+          <a:lstStyle/>
+          <a:p>
+            <a:r>
+              <a:rPr lang="en-US" dirty="0"/>
+              <a:t>Did this project change how you felt about owning your own businesses?</a:t>
+            </a:r>
+          </a:p>
+        </p:txBody>
+      </p:sp>
+      <p:sp>
+        <p:nvSpPr>
+          <p:cNvPr id="3" name="Content Placeholder 2">
+            <a:extLst>
+              <a:ext uri="{FF2B5EF4-FFF2-40B4-BE49-F238E27FC236}">
+                <a16:creationId xmlns:a16="http://schemas.microsoft.com/office/drawing/2014/main" id="{432FE1D8-B326-481A-AE71-CC32AF3F969C}"/>
+              </a:ext>
+            </a:extLst>
+          </p:cNvPr>
+          <p:cNvSpPr>
+            <a:spLocks noGrp="1"/>
+          </p:cNvSpPr>
+          <p:nvPr>
+            <p:ph idx="1"/>
+          </p:nvPr>
+        </p:nvSpPr>
+        <p:spPr/>
+        <p:txBody>
+          <a:bodyPr>
+            <a:normAutofit/>
+          </a:bodyPr>
+          <a:lstStyle/>
+          <a:p>
+            <a:pPr rtl="0">
+              <a:spcBef>
+                <a:spcPts val="0"/>
+              </a:spcBef>
+              <a:spcAft>
+                <a:spcPts val="800"/>
+              </a:spcAft>
+            </a:pPr>
+            <a:r>
+              <a:rPr lang="en-US" sz="2800" dirty="0"/>
+              <a:t>Changed how I feel about owning my own business for the better</a:t>
+            </a:r>
+          </a:p>
+          <a:p>
+            <a:pPr rtl="0">
+              <a:spcBef>
+                <a:spcPts val="0"/>
+              </a:spcBef>
+              <a:spcAft>
+                <a:spcPts val="800"/>
+              </a:spcAft>
+            </a:pPr>
+            <a:r>
+              <a:rPr lang="en-US" sz="2800" dirty="0"/>
+              <a:t>Increased confidence that I can be as successful as my male counterparts</a:t>
+            </a:r>
+          </a:p>
+          <a:p>
+            <a:pPr rtl="0">
+              <a:spcBef>
+                <a:spcPts val="0"/>
+              </a:spcBef>
+              <a:spcAft>
+                <a:spcPts val="800"/>
+              </a:spcAft>
+            </a:pPr>
+            <a:r>
+              <a:rPr lang="en-US" sz="2800" dirty="0"/>
+              <a:t>Encouraged seizing opportunities early and often </a:t>
+            </a:r>
+            <a:br>
+              <a:rPr lang="en-US" dirty="0"/>
+            </a:br>
+            <a:endParaRPr lang="en-US" dirty="0"/>
+          </a:p>
+        </p:txBody>
+      </p:sp>
+    </p:spTree>
+    <p:extLst>
+      <p:ext uri="{BB962C8B-B14F-4D97-AF65-F5344CB8AC3E}">
+        <p14:creationId xmlns:p14="http://schemas.microsoft.com/office/powerpoint/2010/main" val="1614770663"/>
+      </p:ext>
+    </p:extLst>
+  </p:cSld>
+  <p:clrMapOvr>
+    <a:masterClrMapping/>
+  </p:clrMapOvr>
+  <mc:AlternateContent xmlns:mc="http://schemas.openxmlformats.org/markup-compatibility/2006">
+    <mc:Choice xmlns:p14="http://schemas.microsoft.com/office/powerpoint/2010/main" Requires="p14">
+      <p:transition spd="med" p14:dur="700">
+        <p:fade/>
+      </p:transition>
+    </mc:Choice>
+    <mc:Fallback>
+      <p:transition spd="med">
+        <p:fade/>
+      </p:transition>
+    </mc:Fallback>
+  </mc:AlternateContent>
+  <p:timing>
+    <p:tnLst>
+      <p:par>
+        <p:cTn id="1" dur="indefinite" restart="never" nodeType="tmRoot">
+          <p:childTnLst>
+            <p:seq concurrent="1" nextAc="seek">
+              <p:cTn id="2" dur="indefinite" nodeType="mainSeq">
+                <p:childTnLst>
+                  <p:par>
+                    <p:cTn id="3" fill="hold">
+                      <p:stCondLst>
+                        <p:cond delay="indefinite"/>
+                      </p:stCondLst>
+                      <p:childTnLst>
+                        <p:par>
+                          <p:cTn id="4" fill="hold">
+                            <p:stCondLst>
+                              <p:cond delay="0"/>
+                            </p:stCondLst>
+                            <p:childTnLst>
+                              <p:par>
+                                <p:cTn id="5" presetID="10" presetClass="entr" presetSubtype="0" fill="hold" grpId="0" nodeType="clickEffect">
+                                  <p:stCondLst>
+                                    <p:cond delay="0"/>
+                                  </p:stCondLst>
+                                  <p:childTnLst>
+                                    <p:set>
+                                      <p:cBhvr>
+                                        <p:cTn id="6" dur="1" fill="hold">
+                                          <p:stCondLst>
+                                            <p:cond delay="0"/>
+                                          </p:stCondLst>
+                                        </p:cTn>
+                                        <p:tgtEl>
+                                          <p:spTgt spid="2"/>
+                                        </p:tgtEl>
+                                        <p:attrNameLst>
+                                          <p:attrName>style.visibility</p:attrName>
+                                        </p:attrNameLst>
+                                      </p:cBhvr>
+                                      <p:to>
+                                        <p:strVal val="visible"/>
+                                      </p:to>
+                                    </p:set>
+                                    <p:animEffect transition="in" filter="fade">
+                                      <p:cBhvr>
+                                        <p:cTn id="7" dur="500"/>
+                                        <p:tgtEl>
+                                          <p:spTgt spid="2"/>
+                                        </p:tgtEl>
+                                      </p:cBhvr>
+                                    </p:animEffect>
+                                  </p:childTnLst>
+                                </p:cTn>
+                              </p:par>
+                            </p:childTnLst>
+                          </p:cTn>
+                        </p:par>
+                      </p:childTnLst>
+                    </p:cTn>
+                  </p:par>
+                  <p:par>
+                    <p:cTn id="8" fill="hold">
+                      <p:stCondLst>
+                        <p:cond delay="indefinite"/>
+                      </p:stCondLst>
+                      <p:childTnLst>
+                        <p:par>
+                          <p:cTn id="9" fill="hold">
+                            <p:stCondLst>
+                              <p:cond delay="0"/>
+                            </p:stCondLst>
+                            <p:childTnLst>
+                              <p:par>
+                                <p:cTn id="10" presetID="10" presetClass="entr" presetSubtype="0" fill="hold" grpId="0" nodeType="clickEffect">
+                                  <p:stCondLst>
+                                    <p:cond delay="0"/>
+                                  </p:stCondLst>
+                                  <p:childTnLst>
+                                    <p:set>
+                                      <p:cBhvr>
+                                        <p:cTn id="11" dur="1" fill="hold">
+                                          <p:stCondLst>
+                                            <p:cond delay="0"/>
+                                          </p:stCondLst>
+                                        </p:cTn>
+                                        <p:tgtEl>
+                                          <p:spTgt spid="3">
+                                            <p:txEl>
+                                              <p:pRg st="0" end="0"/>
+                                            </p:txEl>
+                                          </p:spTgt>
+                                        </p:tgtEl>
+                                        <p:attrNameLst>
+                                          <p:attrName>style.visibility</p:attrName>
+                                        </p:attrNameLst>
+                                      </p:cBhvr>
+                                      <p:to>
+                                        <p:strVal val="visible"/>
+                                      </p:to>
+                                    </p:set>
+                                    <p:animEffect transition="in" filter="fade">
+                                      <p:cBhvr>
+                                        <p:cTn id="12" dur="500"/>
+                                        <p:tgtEl>
+                                          <p:spTgt spid="3">
+                                            <p:txEl>
+                                              <p:pRg st="0" end="0"/>
+                                            </p:txEl>
+                                          </p:spTgt>
+                                        </p:tgtEl>
+                                      </p:cBhvr>
+                                    </p:animEffect>
+                                  </p:childTnLst>
+                                </p:cTn>
+                              </p:par>
+                            </p:childTnLst>
+                          </p:cTn>
+                        </p:par>
+                      </p:childTnLst>
+                    </p:cTn>
+                  </p:par>
+                  <p:par>
+                    <p:cTn id="13" fill="hold">
+                      <p:stCondLst>
+                        <p:cond delay="indefinite"/>
+                      </p:stCondLst>
+                      <p:childTnLst>
+                        <p:par>
+                          <p:cTn id="14" fill="hold">
+                            <p:stCondLst>
+                              <p:cond delay="0"/>
+                            </p:stCondLst>
+                            <p:childTnLst>
+                              <p:par>
+                                <p:cTn id="15" presetID="10" presetClass="entr" presetSubtype="0" fill="hold" grpId="0" nodeType="clickEffect">
+                                  <p:stCondLst>
+                                    <p:cond delay="0"/>
+                                  </p:stCondLst>
+                                  <p:childTnLst>
+                                    <p:set>
+                                      <p:cBhvr>
+                                        <p:cTn id="16" dur="1" fill="hold">
+                                          <p:stCondLst>
+                                            <p:cond delay="0"/>
+                                          </p:stCondLst>
+                                        </p:cTn>
+                                        <p:tgtEl>
+                                          <p:spTgt spid="3">
+                                            <p:txEl>
+                                              <p:pRg st="1" end="1"/>
+                                            </p:txEl>
+                                          </p:spTgt>
+                                        </p:tgtEl>
+                                        <p:attrNameLst>
+                                          <p:attrName>style.visibility</p:attrName>
+                                        </p:attrNameLst>
+                                      </p:cBhvr>
+                                      <p:to>
+                                        <p:strVal val="visible"/>
+                                      </p:to>
+                                    </p:set>
+                                    <p:animEffect transition="in" filter="fade">
+                                      <p:cBhvr>
+                                        <p:cTn id="17" dur="500"/>
+                                        <p:tgtEl>
+                                          <p:spTgt spid="3">
+                                            <p:txEl>
+                                              <p:pRg st="1" end="1"/>
+                                            </p:txEl>
+                                          </p:spTgt>
+                                        </p:tgtEl>
+                                      </p:cBhvr>
+                                    </p:animEffect>
+                                  </p:childTnLst>
+                                </p:cTn>
+                              </p:par>
+                            </p:childTnLst>
+                          </p:cTn>
+                        </p:par>
+                      </p:childTnLst>
+                    </p:cTn>
+                  </p:par>
+                  <p:par>
+                    <p:cTn id="18" fill="hold">
+                      <p:stCondLst>
+                        <p:cond delay="indefinite"/>
+                      </p:stCondLst>
+                      <p:childTnLst>
+                        <p:par>
+                          <p:cTn id="19" fill="hold">
+                            <p:stCondLst>
+                              <p:cond delay="0"/>
+                            </p:stCondLst>
+                            <p:childTnLst>
+                              <p:par>
+                                <p:cTn id="20" presetID="10" presetClass="entr" presetSubtype="0" fill="hold" grpId="0" nodeType="clickEffect">
+                                  <p:stCondLst>
+                                    <p:cond delay="0"/>
+                                  </p:stCondLst>
+                                  <p:childTnLst>
+                                    <p:set>
+                                      <p:cBhvr>
+                                        <p:cTn id="21" dur="1" fill="hold">
+                                          <p:stCondLst>
+                                            <p:cond delay="0"/>
+                                          </p:stCondLst>
+                                        </p:cTn>
+                                        <p:tgtEl>
+                                          <p:spTgt spid="3">
+                                            <p:txEl>
+                                              <p:pRg st="2" end="2"/>
+                                            </p:txEl>
+                                          </p:spTgt>
+                                        </p:tgtEl>
+                                        <p:attrNameLst>
+                                          <p:attrName>style.visibility</p:attrName>
+                                        </p:attrNameLst>
+                                      </p:cBhvr>
+                                      <p:to>
+                                        <p:strVal val="visible"/>
+                                      </p:to>
+                                    </p:set>
+                                    <p:animEffect transition="in" filter="fade">
+                                      <p:cBhvr>
+                                        <p:cTn id="22" dur="500"/>
+                                        <p:tgtEl>
+                                          <p:spTgt spid="3">
+                                            <p:txEl>
+                                              <p:pRg st="2" end="2"/>
+                                            </p:txEl>
+                                          </p:spTgt>
+                                        </p:tgtEl>
+                                      </p:cBhvr>
+                                    </p:animEffect>
+                                  </p:childTnLst>
+                                </p:cTn>
+                              </p:par>
+                            </p:childTnLst>
+                          </p:cTn>
+                        </p:par>
+                      </p:childTnLst>
+                    </p:cTn>
+                  </p:par>
+                </p:childTnLst>
+              </p:cTn>
+              <p:prevCondLst>
+                <p:cond evt="onPrev" delay="0">
+                  <p:tgtEl>
+                    <p:sldTgt/>
+                  </p:tgtEl>
+                </p:cond>
+              </p:prevCondLst>
+              <p:nextCondLst>
+                <p:cond evt="onNext" delay="0">
+                  <p:tgtEl>
+                    <p:sldTgt/>
+                  </p:tgtEl>
+                </p:cond>
+              </p:nextCondLst>
+            </p:seq>
+          </p:childTnLst>
+        </p:cTn>
+      </p:par>
+    </p:tnLst>
+    <p:bldLst>
+      <p:bldP spid="2" grpId="0"/>
+      <p:bldP spid="3" grpId="0" build="p"/>
+    </p:bldLst>
+  </p:timing>
+</p:sld>
+</file>
+
+<file path=ppt/slides/slide27.xml><?xml version="1.0" encoding="utf-8"?>
+<p:sld xmlns:a="http://schemas.openxmlformats.org/drawingml/2006/main" xmlns:r="http://schemas.openxmlformats.org/officeDocument/2006/relationships" xmlns:p="http://schemas.openxmlformats.org/presentationml/2006/main">
+  <p:cSld>
+    <p:spTree>
+      <p:nvGrpSpPr>
+        <p:cNvPr id="1" name=""/>
+        <p:cNvGrpSpPr/>
+        <p:nvPr/>
+      </p:nvGrpSpPr>
+      <p:grpSpPr>
+        <a:xfrm>
+          <a:off x="0" y="0"/>
+          <a:ext cx="0" cy="0"/>
+          <a:chOff x="0" y="0"/>
+          <a:chExt cx="0" cy="0"/>
+        </a:xfrm>
+      </p:grpSpPr>
+      <p:sp>
+        <p:nvSpPr>
+          <p:cNvPr id="2" name="Title 1">
+            <a:extLst>
+              <a:ext uri="{FF2B5EF4-FFF2-40B4-BE49-F238E27FC236}">
+                <a16:creationId xmlns:a16="http://schemas.microsoft.com/office/drawing/2014/main" id="{E6171A0E-422B-45DA-9D0E-6949BF32A3BD}"/>
+              </a:ext>
+            </a:extLst>
+          </p:cNvPr>
+          <p:cNvSpPr>
+            <a:spLocks noGrp="1"/>
+          </p:cNvSpPr>
+          <p:nvPr>
+            <p:ph type="title"/>
+          </p:nvPr>
+        </p:nvSpPr>
+        <p:spPr/>
+        <p:txBody>
+          <a:bodyPr/>
+          <a:lstStyle/>
+          <a:p>
+            <a:r>
+              <a:rPr lang="en-US" dirty="0"/>
               <a:t>Bibliography </a:t>
             </a:r>
           </a:p>
@@ -15706,10 +17143,6 @@
               <a:rPr lang="en-US" sz="2400" dirty="0"/>
               <a:t>U.S. Census Bureau: Annual Business Surveys (2018-2020)</a:t>
             </a:r>
-            <a:r>
-              <a:rPr lang="en-US" dirty="0"/>
-              <a:t/>
-            </a:r>
             <a:br>
               <a:rPr lang="en-US" dirty="0"/>
             </a:br>
@@ -15727,10 +17160,22 @@
   <p:clrMapOvr>
     <a:masterClrMapping/>
   </p:clrMapOvr>
+  <mc:AlternateContent xmlns:mc="http://schemas.openxmlformats.org/markup-compatibility/2006">
+    <mc:Choice xmlns:p14="http://schemas.microsoft.com/office/powerpoint/2010/main" Requires="p14">
+      <p:transition spd="med" p14:dur="700">
+        <p:fade/>
+      </p:transition>
+    </mc:Choice>
+    <mc:Fallback>
+      <p:transition spd="med">
+        <p:fade/>
+      </p:transition>
+    </mc:Fallback>
+  </mc:AlternateContent>
 </p:sld>
 </file>
 
-<file path=ppt/slides/slide25.xml><?xml version="1.0" encoding="utf-8"?>
+<file path=ppt/slides/slide28.xml><?xml version="1.0" encoding="utf-8"?>
 <p:sld xmlns:a="http://schemas.openxmlformats.org/drawingml/2006/main" xmlns:r="http://schemas.openxmlformats.org/officeDocument/2006/relationships" xmlns:p="http://schemas.openxmlformats.org/presentationml/2006/main">
   <p:cSld>
     <p:spTree>
@@ -15749,7 +17194,13 @@
       </p:grpSpPr>
       <p:sp>
         <p:nvSpPr>
-          <p:cNvPr id="2" name="Title 1"/>
+          <p:cNvPr id="2" name="Title 1">
+            <a:extLst>
+              <a:ext uri="{FF2B5EF4-FFF2-40B4-BE49-F238E27FC236}">
+                <a16:creationId xmlns:a16="http://schemas.microsoft.com/office/drawing/2014/main" id="{E5D1D92E-DBD1-4D94-A3CB-BA00A2DCF892}"/>
+              </a:ext>
+            </a:extLst>
+          </p:cNvPr>
           <p:cNvSpPr>
             <a:spLocks noGrp="1"/>
           </p:cNvSpPr>
@@ -15757,26 +17208,28 @@
             <p:ph type="title"/>
           </p:nvPr>
         </p:nvSpPr>
-        <p:spPr>
-          <a:xfrm>
-            <a:off x="711810" y="500062"/>
-            <a:ext cx="10515600" cy="1325563"/>
-          </a:xfrm>
-        </p:spPr>
+        <p:spPr/>
         <p:txBody>
           <a:bodyPr/>
           <a:lstStyle/>
           <a:p>
             <a:r>
-              <a:rPr lang="en-US" sz="5400" dirty="0"/>
+              <a:rPr lang="en-US" sz="4800" dirty="0"/>
               <a:t>Lessons Learned</a:t>
             </a:r>
+            <a:endParaRPr lang="en-US" dirty="0"/>
           </a:p>
         </p:txBody>
       </p:sp>
       <p:sp>
         <p:nvSpPr>
-          <p:cNvPr id="3" name="Content Placeholder 2"/>
+          <p:cNvPr id="3" name="Content Placeholder 2">
+            <a:extLst>
+              <a:ext uri="{FF2B5EF4-FFF2-40B4-BE49-F238E27FC236}">
+                <a16:creationId xmlns:a16="http://schemas.microsoft.com/office/drawing/2014/main" id="{248AECDB-3C85-476B-AC5C-750F499A1A15}"/>
+              </a:ext>
+            </a:extLst>
+          </p:cNvPr>
           <p:cNvSpPr>
             <a:spLocks noGrp="1"/>
           </p:cNvSpPr>
@@ -15786,8 +17239,8 @@
         </p:nvSpPr>
         <p:spPr>
           <a:xfrm>
-            <a:off x="838200" y="1825625"/>
-            <a:ext cx="5894373" cy="4351338"/>
+            <a:off x="1154954" y="2603499"/>
+            <a:ext cx="9614646" cy="3966633"/>
           </a:xfrm>
         </p:spPr>
         <p:txBody>
@@ -15796,47 +17249,10 @@
           </a:bodyPr>
           <a:lstStyle/>
           <a:p>
-            <a:endParaRPr lang="en-US" dirty="0"/>
-          </a:p>
-          <a:p>
-            <a:endParaRPr lang="en-US" dirty="0"/>
-          </a:p>
-        </p:txBody>
-      </p:sp>
-      <p:sp>
-        <p:nvSpPr>
-          <p:cNvPr id="6" name="TextBox 5">
-            <a:extLst>
-              <a:ext uri="{FF2B5EF4-FFF2-40B4-BE49-F238E27FC236}">
-                <a16:creationId xmlns:a16="http://schemas.microsoft.com/office/drawing/2014/main" id="{8ED8DE46-E2DE-41CE-91CB-142EEDBF5F48}"/>
-              </a:ext>
-            </a:extLst>
-          </p:cNvPr>
-          <p:cNvSpPr txBox="1"/>
-          <p:nvPr/>
-        </p:nvSpPr>
-        <p:spPr>
-          <a:xfrm>
-            <a:off x="1061155" y="2575977"/>
-            <a:ext cx="9234311" cy="3600986"/>
-          </a:xfrm>
-          <a:prstGeom prst="rect">
-            <a:avLst/>
-          </a:prstGeom>
-          <a:noFill/>
-        </p:spPr>
-        <p:txBody>
-          <a:bodyPr wrap="square" rtlCol="0">
-            <a:spAutoFit/>
-          </a:bodyPr>
-          <a:lstStyle/>
-          <a:p>
-            <a:pPr marL="285750" indent="-285750">
+            <a:pPr>
               <a:lnSpc>
-                <a:spcPct val="150000"/>
+                <a:spcPct val="160000"/>
               </a:lnSpc>
-              <a:buFont typeface="Arial" panose="020B0604020202020204" pitchFamily="34" charset="0"/>
-              <a:buChar char="•"/>
             </a:pPr>
             <a:r>
               <a:rPr lang="en-US" sz="2000" dirty="0"/>
@@ -15844,12 +17260,10 @@
             </a:r>
           </a:p>
           <a:p>
-            <a:pPr marL="285750" indent="-285750">
+            <a:pPr>
               <a:lnSpc>
-                <a:spcPct val="150000"/>
+                <a:spcPct val="160000"/>
               </a:lnSpc>
-              <a:buFont typeface="Arial" panose="020B0604020202020204" pitchFamily="34" charset="0"/>
-              <a:buChar char="•"/>
             </a:pPr>
             <a:r>
               <a:rPr lang="en-US" sz="2000" dirty="0"/>
@@ -15857,12 +17271,10 @@
             </a:r>
           </a:p>
           <a:p>
-            <a:pPr marL="285750" indent="-285750">
+            <a:pPr>
               <a:lnSpc>
-                <a:spcPct val="150000"/>
+                <a:spcPct val="160000"/>
               </a:lnSpc>
-              <a:buFont typeface="Arial" panose="020B0604020202020204" pitchFamily="34" charset="0"/>
-              <a:buChar char="•"/>
             </a:pPr>
             <a:r>
               <a:rPr lang="en-US" sz="2000" dirty="0"/>
@@ -15870,37 +17282,40 @@
             </a:r>
           </a:p>
           <a:p>
-            <a:pPr marL="285750" indent="-285750">
+            <a:pPr>
               <a:lnSpc>
-                <a:spcPct val="150000"/>
+                <a:spcPct val="160000"/>
               </a:lnSpc>
-              <a:buFont typeface="Arial" panose="020B0604020202020204" pitchFamily="34" charset="0"/>
-              <a:buChar char="•"/>
             </a:pPr>
             <a:r>
               <a:rPr lang="en-US" sz="2000" dirty="0"/>
               <a:t>Started with basic statistical analysis before attempting more advanced statistical analysis</a:t>
             </a:r>
-          </a:p>
-          <a:p>
-            <a:pPr marL="285750" indent="-285750">
-              <a:buFont typeface="Arial" panose="020B0604020202020204" pitchFamily="34" charset="0"/>
-              <a:buChar char="•"/>
-            </a:pPr>
-            <a:endParaRPr lang="en-US" dirty="0"/>
           </a:p>
         </p:txBody>
       </p:sp>
     </p:spTree>
     <p:extLst>
       <p:ext uri="{BB962C8B-B14F-4D97-AF65-F5344CB8AC3E}">
-        <p14:creationId xmlns:p14="http://schemas.microsoft.com/office/powerpoint/2010/main" val="1246139815"/>
+        <p14:creationId xmlns:p14="http://schemas.microsoft.com/office/powerpoint/2010/main" val="377468140"/>
       </p:ext>
     </p:extLst>
   </p:cSld>
   <p:clrMapOvr>
     <a:masterClrMapping/>
   </p:clrMapOvr>
+  <mc:AlternateContent xmlns:mc="http://schemas.openxmlformats.org/markup-compatibility/2006">
+    <mc:Choice xmlns:p14="http://schemas.microsoft.com/office/powerpoint/2010/main" Requires="p14">
+      <p:transition spd="med" p14:dur="700">
+        <p:fade/>
+      </p:transition>
+    </mc:Choice>
+    <mc:Fallback>
+      <p:transition spd="med">
+        <p:fade/>
+      </p:transition>
+    </mc:Fallback>
+  </mc:AlternateContent>
 </p:sld>
 </file>
 
@@ -16117,19 +17532,6 @@
               <a:buNone/>
               <a:tabLst/>
             </a:pPr>
-            <a:r>
-              <a:rPr kumimoji="0" lang="en-US" altLang="en-US" sz="1100" b="0" i="0" u="none" strike="noStrike" cap="none" normalizeH="0" baseline="0">
-                <a:ln>
-                  <a:noFill/>
-                </a:ln>
-                <a:solidFill>
-                  <a:srgbClr val="1D1C1D"/>
-                </a:solidFill>
-                <a:effectLst/>
-                <a:latin typeface="Slack-Lato"/>
-              </a:rPr>
-              <a:t/>
-            </a:r>
             <a:br>
               <a:rPr kumimoji="0" lang="en-US" altLang="en-US" sz="1100" b="0" i="0" u="none" strike="noStrike" cap="none" normalizeH="0" baseline="0">
                 <a:ln>
@@ -16205,6 +17607,18 @@
   <p:clrMapOvr>
     <a:masterClrMapping/>
   </p:clrMapOvr>
+  <mc:AlternateContent xmlns:mc="http://schemas.openxmlformats.org/markup-compatibility/2006">
+    <mc:Choice xmlns:p14="http://schemas.microsoft.com/office/powerpoint/2010/main" Requires="p14">
+      <p:transition spd="med" p14:dur="700">
+        <p:fade/>
+      </p:transition>
+    </mc:Choice>
+    <mc:Fallback>
+      <p:transition spd="med">
+        <p:fade/>
+      </p:transition>
+    </mc:Fallback>
+  </mc:AlternateContent>
 </p:sld>
 </file>
 
@@ -16431,19 +17845,6 @@
               <a:buNone/>
               <a:tabLst/>
             </a:pPr>
-            <a:r>
-              <a:rPr kumimoji="0" lang="en-US" altLang="en-US" sz="1100" b="0" i="0" u="none" strike="noStrike" cap="none" normalizeH="0" baseline="0">
-                <a:ln>
-                  <a:noFill/>
-                </a:ln>
-                <a:solidFill>
-                  <a:srgbClr val="1D1C1D"/>
-                </a:solidFill>
-                <a:effectLst/>
-                <a:latin typeface="Slack-Lato"/>
-              </a:rPr>
-              <a:t/>
-            </a:r>
             <a:br>
               <a:rPr kumimoji="0" lang="en-US" altLang="en-US" sz="1100" b="0" i="0" u="none" strike="noStrike" cap="none" normalizeH="0" baseline="0">
                 <a:ln>
@@ -16522,6 +17923,18 @@
   <p:clrMapOvr>
     <a:masterClrMapping/>
   </p:clrMapOvr>
+  <mc:AlternateContent xmlns:mc="http://schemas.openxmlformats.org/markup-compatibility/2006">
+    <mc:Choice xmlns:p14="http://schemas.microsoft.com/office/powerpoint/2010/main" Requires="p14">
+      <p:transition spd="med" p14:dur="700">
+        <p:fade/>
+      </p:transition>
+    </mc:Choice>
+    <mc:Fallback>
+      <p:transition spd="med">
+        <p:fade/>
+      </p:transition>
+    </mc:Fallback>
+  </mc:AlternateContent>
 </p:sld>
 </file>
 
@@ -16657,6 +18070,18 @@
   <p:clrMapOvr>
     <a:masterClrMapping/>
   </p:clrMapOvr>
+  <mc:AlternateContent xmlns:mc="http://schemas.openxmlformats.org/markup-compatibility/2006">
+    <mc:Choice xmlns:p14="http://schemas.microsoft.com/office/powerpoint/2010/main" Requires="p14">
+      <p:transition spd="med" p14:dur="700">
+        <p:fade/>
+      </p:transition>
+    </mc:Choice>
+    <mc:Fallback>
+      <p:transition spd="med">
+        <p:fade/>
+      </p:transition>
+    </mc:Fallback>
+  </mc:AlternateContent>
 </p:sld>
 </file>
 
@@ -16835,6 +18260,18 @@
   <p:clrMapOvr>
     <a:masterClrMapping/>
   </p:clrMapOvr>
+  <mc:AlternateContent xmlns:mc="http://schemas.openxmlformats.org/markup-compatibility/2006">
+    <mc:Choice xmlns:p14="http://schemas.microsoft.com/office/powerpoint/2010/main" Requires="p14">
+      <p:transition spd="med" p14:dur="700">
+        <p:fade/>
+      </p:transition>
+    </mc:Choice>
+    <mc:Fallback>
+      <p:transition spd="med">
+        <p:fade/>
+      </p:transition>
+    </mc:Fallback>
+  </mc:AlternateContent>
 </p:sld>
 </file>
 
@@ -16903,6 +18340,18 @@
   <p:clrMapOvr>
     <a:masterClrMapping/>
   </p:clrMapOvr>
+  <mc:AlternateContent xmlns:mc="http://schemas.openxmlformats.org/markup-compatibility/2006">
+    <mc:Choice xmlns:p14="http://schemas.microsoft.com/office/powerpoint/2010/main" Requires="p14">
+      <p:transition spd="med" p14:dur="700">
+        <p:fade/>
+      </p:transition>
+    </mc:Choice>
+    <mc:Fallback>
+      <p:transition spd="med">
+        <p:fade/>
+      </p:transition>
+    </mc:Fallback>
+  </mc:AlternateContent>
   <p:timing>
     <p:tnLst>
       <p:par>
@@ -17216,6 +18665,18 @@
   <p:clrMapOvr>
     <a:masterClrMapping/>
   </p:clrMapOvr>
+  <mc:AlternateContent xmlns:mc="http://schemas.openxmlformats.org/markup-compatibility/2006">
+    <mc:Choice xmlns:p14="http://schemas.microsoft.com/office/powerpoint/2010/main" Requires="p14">
+      <p:transition spd="med" p14:dur="700">
+        <p:fade/>
+      </p:transition>
+    </mc:Choice>
+    <mc:Fallback>
+      <p:transition spd="med">
+        <p:fade/>
+      </p:transition>
+    </mc:Fallback>
+  </mc:AlternateContent>
 </p:sld>
 </file>
 
@@ -17331,6 +18792,18 @@
   <p:clrMapOvr>
     <a:masterClrMapping/>
   </p:clrMapOvr>
+  <mc:AlternateContent xmlns:mc="http://schemas.openxmlformats.org/markup-compatibility/2006">
+    <mc:Choice xmlns:p14="http://schemas.microsoft.com/office/powerpoint/2010/main" Requires="p14">
+      <p:transition spd="med" p14:dur="700">
+        <p:fade/>
+      </p:transition>
+    </mc:Choice>
+    <mc:Fallback>
+      <p:transition spd="med">
+        <p:fade/>
+      </p:transition>
+    </mc:Fallback>
+  </mc:AlternateContent>
 </p:sld>
 </file>
 

</xml_diff>